<commit_message>
minor change to docs/revised.pptx
</commit_message>
<xml_diff>
--- a/docs/revised.pptx
+++ b/docs/revised.pptx
@@ -3098,7 +3098,7 @@
           <a:p>
             <a:fld id="{E85674F1-98A6-594B-85E4-D3870963F00F}" type="datetimeFigureOut">
               <a:rPr lang="en-US" smtClean="0"/>
-              <a:t>1/14/26</a:t>
+              <a:t>1/19/26</a:t>
             </a:fld>
             <a:endParaRPr lang="en-US"/>
           </a:p>
@@ -5809,7 +5809,7 @@
           <a:p>
             <a:fld id="{271DB9ED-E045-134F-B3F2-C9B359932CAC}" type="datetimeFigureOut">
               <a:rPr lang="en-US" smtClean="0"/>
-              <a:t>1/14/26</a:t>
+              <a:t>1/19/26</a:t>
             </a:fld>
             <a:endParaRPr lang="en-US"/>
           </a:p>
@@ -6007,7 +6007,7 @@
           <a:p>
             <a:fld id="{271DB9ED-E045-134F-B3F2-C9B359932CAC}" type="datetimeFigureOut">
               <a:rPr lang="en-US" smtClean="0"/>
-              <a:t>1/14/26</a:t>
+              <a:t>1/19/26</a:t>
             </a:fld>
             <a:endParaRPr lang="en-US"/>
           </a:p>
@@ -6215,7 +6215,7 @@
           <a:p>
             <a:fld id="{271DB9ED-E045-134F-B3F2-C9B359932CAC}" type="datetimeFigureOut">
               <a:rPr lang="en-US" smtClean="0"/>
-              <a:t>1/14/26</a:t>
+              <a:t>1/19/26</a:t>
             </a:fld>
             <a:endParaRPr lang="en-US"/>
           </a:p>
@@ -6413,7 +6413,7 @@
           <a:p>
             <a:fld id="{271DB9ED-E045-134F-B3F2-C9B359932CAC}" type="datetimeFigureOut">
               <a:rPr lang="en-US" smtClean="0"/>
-              <a:t>1/14/26</a:t>
+              <a:t>1/19/26</a:t>
             </a:fld>
             <a:endParaRPr lang="en-US"/>
           </a:p>
@@ -6688,7 +6688,7 @@
           <a:p>
             <a:fld id="{271DB9ED-E045-134F-B3F2-C9B359932CAC}" type="datetimeFigureOut">
               <a:rPr lang="en-US" smtClean="0"/>
-              <a:t>1/14/26</a:t>
+              <a:t>1/19/26</a:t>
             </a:fld>
             <a:endParaRPr lang="en-US"/>
           </a:p>
@@ -6953,7 +6953,7 @@
           <a:p>
             <a:fld id="{271DB9ED-E045-134F-B3F2-C9B359932CAC}" type="datetimeFigureOut">
               <a:rPr lang="en-US" smtClean="0"/>
-              <a:t>1/14/26</a:t>
+              <a:t>1/19/26</a:t>
             </a:fld>
             <a:endParaRPr lang="en-US"/>
           </a:p>
@@ -7365,7 +7365,7 @@
           <a:p>
             <a:fld id="{271DB9ED-E045-134F-B3F2-C9B359932CAC}" type="datetimeFigureOut">
               <a:rPr lang="en-US" smtClean="0"/>
-              <a:t>1/14/26</a:t>
+              <a:t>1/19/26</a:t>
             </a:fld>
             <a:endParaRPr lang="en-US"/>
           </a:p>
@@ -7506,7 +7506,7 @@
           <a:p>
             <a:fld id="{271DB9ED-E045-134F-B3F2-C9B359932CAC}" type="datetimeFigureOut">
               <a:rPr lang="en-US" smtClean="0"/>
-              <a:t>1/14/26</a:t>
+              <a:t>1/19/26</a:t>
             </a:fld>
             <a:endParaRPr lang="en-US"/>
           </a:p>
@@ -7619,7 +7619,7 @@
           <a:p>
             <a:fld id="{271DB9ED-E045-134F-B3F2-C9B359932CAC}" type="datetimeFigureOut">
               <a:rPr lang="en-US" smtClean="0"/>
-              <a:t>1/14/26</a:t>
+              <a:t>1/19/26</a:t>
             </a:fld>
             <a:endParaRPr lang="en-US"/>
           </a:p>
@@ -7930,7 +7930,7 @@
           <a:p>
             <a:fld id="{271DB9ED-E045-134F-B3F2-C9B359932CAC}" type="datetimeFigureOut">
               <a:rPr lang="en-US" smtClean="0"/>
-              <a:t>1/14/26</a:t>
+              <a:t>1/19/26</a:t>
             </a:fld>
             <a:endParaRPr lang="en-US"/>
           </a:p>
@@ -8218,7 +8218,7 @@
           <a:p>
             <a:fld id="{271DB9ED-E045-134F-B3F2-C9B359932CAC}" type="datetimeFigureOut">
               <a:rPr lang="en-US" smtClean="0"/>
-              <a:t>1/14/26</a:t>
+              <a:t>1/19/26</a:t>
             </a:fld>
             <a:endParaRPr lang="en-US"/>
           </a:p>
@@ -8459,7 +8459,7 @@
           <a:p>
             <a:fld id="{271DB9ED-E045-134F-B3F2-C9B359932CAC}" type="datetimeFigureOut">
               <a:rPr lang="en-US" smtClean="0"/>
-              <a:t>1/14/26</a:t>
+              <a:t>1/19/26</a:t>
             </a:fld>
             <a:endParaRPr lang="en-US"/>
           </a:p>
@@ -9115,7 +9115,7 @@
             </a:pPr>
             <a:r>
               <a:rPr lang="en-US" dirty="0"/>
-              <a:t>👉 the agent doesn’t just talk — it responds with data that other systems can reliably consume.</a:t>
+              <a:t>👉 The agent doesn’t just talk - it responds with data that other systems can reliably consume.</a:t>
             </a:r>
           </a:p>
           <a:p>
@@ -9334,12 +9334,11 @@
               <a:rPr lang="en-US" dirty="0"/>
               <a:t>We can design a set of microservices, exposing APIs that receive data and instructions, supported by classes that can interact with one another.</a:t>
             </a:r>
-            <a:br>
+          </a:p>
+          <a:p>
+            <a:r>
               <a:rPr lang="en-US" dirty="0"/>
-            </a:br>
-            <a:r>
-              <a:rPr lang="en-US" dirty="0"/>
-              <a:t> Each class encapsulates its own AI-driven business logic and is able to orchestrate with other components, producing high-quality and consistent results.</a:t>
+              <a:t>Each class encapsulates its own AI-driven business logic and is able to orchestrate with other components, producing high-quality and consistent results.</a:t>
             </a:r>
           </a:p>
           <a:p>
@@ -12180,7 +12179,7 @@
 </file>
 
 <file path=ppt/slides/slide6.xml><?xml version="1.0" encoding="utf-8"?>
-<p:sld xmlns:a="http://schemas.openxmlformats.org/drawingml/2006/main" xmlns:r="http://schemas.openxmlformats.org/officeDocument/2006/relationships" xmlns:p="http://schemas.openxmlformats.org/presentationml/2006/main">
+<p:sld xmlns:a="http://schemas.openxmlformats.org/drawingml/2006/main" xmlns:r="http://schemas.openxmlformats.org/officeDocument/2006/relationships" xmlns:p="http://schemas.openxmlformats.org/presentationml/2006/main" show="0">
   <p:cSld>
     <p:spTree>
       <p:nvGrpSpPr>

</xml_diff>

<commit_message>
worked on prj2 readme
</commit_message>
<xml_diff>
--- a/docs/revised.pptx
+++ b/docs/revised.pptx
@@ -22,8 +22,8 @@
     <p:sldId id="259" r:id="rId13"/>
     <p:sldId id="260" r:id="rId14"/>
     <p:sldId id="262" r:id="rId15"/>
-    <p:sldId id="263" r:id="rId16"/>
-    <p:sldId id="264" r:id="rId17"/>
+    <p:sldId id="264" r:id="rId16"/>
+    <p:sldId id="263" r:id="rId17"/>
     <p:sldId id="265" r:id="rId18"/>
     <p:sldId id="282" r:id="rId19"/>
     <p:sldId id="295" r:id="rId20"/>
@@ -3098,7 +3098,7 @@
           <a:p>
             <a:fld id="{E85674F1-98A6-594B-85E4-D3870963F00F}" type="datetimeFigureOut">
               <a:rPr lang="en-US" smtClean="0"/>
-              <a:t>1/19/26</a:t>
+              <a:t>1/20/26</a:t>
             </a:fld>
             <a:endParaRPr lang="en-US"/>
           </a:p>
@@ -5809,7 +5809,7 @@
           <a:p>
             <a:fld id="{271DB9ED-E045-134F-B3F2-C9B359932CAC}" type="datetimeFigureOut">
               <a:rPr lang="en-US" smtClean="0"/>
-              <a:t>1/19/26</a:t>
+              <a:t>1/20/26</a:t>
             </a:fld>
             <a:endParaRPr lang="en-US"/>
           </a:p>
@@ -6007,7 +6007,7 @@
           <a:p>
             <a:fld id="{271DB9ED-E045-134F-B3F2-C9B359932CAC}" type="datetimeFigureOut">
               <a:rPr lang="en-US" smtClean="0"/>
-              <a:t>1/19/26</a:t>
+              <a:t>1/20/26</a:t>
             </a:fld>
             <a:endParaRPr lang="en-US"/>
           </a:p>
@@ -6215,7 +6215,7 @@
           <a:p>
             <a:fld id="{271DB9ED-E045-134F-B3F2-C9B359932CAC}" type="datetimeFigureOut">
               <a:rPr lang="en-US" smtClean="0"/>
-              <a:t>1/19/26</a:t>
+              <a:t>1/20/26</a:t>
             </a:fld>
             <a:endParaRPr lang="en-US"/>
           </a:p>
@@ -6413,7 +6413,7 @@
           <a:p>
             <a:fld id="{271DB9ED-E045-134F-B3F2-C9B359932CAC}" type="datetimeFigureOut">
               <a:rPr lang="en-US" smtClean="0"/>
-              <a:t>1/19/26</a:t>
+              <a:t>1/20/26</a:t>
             </a:fld>
             <a:endParaRPr lang="en-US"/>
           </a:p>
@@ -6688,7 +6688,7 @@
           <a:p>
             <a:fld id="{271DB9ED-E045-134F-B3F2-C9B359932CAC}" type="datetimeFigureOut">
               <a:rPr lang="en-US" smtClean="0"/>
-              <a:t>1/19/26</a:t>
+              <a:t>1/20/26</a:t>
             </a:fld>
             <a:endParaRPr lang="en-US"/>
           </a:p>
@@ -6953,7 +6953,7 @@
           <a:p>
             <a:fld id="{271DB9ED-E045-134F-B3F2-C9B359932CAC}" type="datetimeFigureOut">
               <a:rPr lang="en-US" smtClean="0"/>
-              <a:t>1/19/26</a:t>
+              <a:t>1/20/26</a:t>
             </a:fld>
             <a:endParaRPr lang="en-US"/>
           </a:p>
@@ -7365,7 +7365,7 @@
           <a:p>
             <a:fld id="{271DB9ED-E045-134F-B3F2-C9B359932CAC}" type="datetimeFigureOut">
               <a:rPr lang="en-US" smtClean="0"/>
-              <a:t>1/19/26</a:t>
+              <a:t>1/20/26</a:t>
             </a:fld>
             <a:endParaRPr lang="en-US"/>
           </a:p>
@@ -7506,7 +7506,7 @@
           <a:p>
             <a:fld id="{271DB9ED-E045-134F-B3F2-C9B359932CAC}" type="datetimeFigureOut">
               <a:rPr lang="en-US" smtClean="0"/>
-              <a:t>1/19/26</a:t>
+              <a:t>1/20/26</a:t>
             </a:fld>
             <a:endParaRPr lang="en-US"/>
           </a:p>
@@ -7619,7 +7619,7 @@
           <a:p>
             <a:fld id="{271DB9ED-E045-134F-B3F2-C9B359932CAC}" type="datetimeFigureOut">
               <a:rPr lang="en-US" smtClean="0"/>
-              <a:t>1/19/26</a:t>
+              <a:t>1/20/26</a:t>
             </a:fld>
             <a:endParaRPr lang="en-US"/>
           </a:p>
@@ -7930,7 +7930,7 @@
           <a:p>
             <a:fld id="{271DB9ED-E045-134F-B3F2-C9B359932CAC}" type="datetimeFigureOut">
               <a:rPr lang="en-US" smtClean="0"/>
-              <a:t>1/19/26</a:t>
+              <a:t>1/20/26</a:t>
             </a:fld>
             <a:endParaRPr lang="en-US"/>
           </a:p>
@@ -8218,7 +8218,7 @@
           <a:p>
             <a:fld id="{271DB9ED-E045-134F-B3F2-C9B359932CAC}" type="datetimeFigureOut">
               <a:rPr lang="en-US" smtClean="0"/>
-              <a:t>1/19/26</a:t>
+              <a:t>1/20/26</a:t>
             </a:fld>
             <a:endParaRPr lang="en-US"/>
           </a:p>
@@ -8459,7 +8459,7 @@
           <a:p>
             <a:fld id="{271DB9ED-E045-134F-B3F2-C9B359932CAC}" type="datetimeFigureOut">
               <a:rPr lang="en-US" smtClean="0"/>
-              <a:t>1/19/26</a:t>
+              <a:t>1/20/26</a:t>
             </a:fld>
             <a:endParaRPr lang="en-US"/>
           </a:p>
@@ -9263,6 +9263,239 @@
 </file>
 
 <file path=ppt/slides/slide13.xml><?xml version="1.0" encoding="utf-8"?>
+<p:sld xmlns:a="http://schemas.openxmlformats.org/drawingml/2006/main" xmlns:r="http://schemas.openxmlformats.org/officeDocument/2006/relationships" xmlns:p="http://schemas.openxmlformats.org/presentationml/2006/main" show="0">
+  <p:cSld>
+    <p:spTree>
+      <p:nvGrpSpPr>
+        <p:cNvPr id="1" name=""/>
+        <p:cNvGrpSpPr/>
+        <p:nvPr/>
+      </p:nvGrpSpPr>
+      <p:grpSpPr>
+        <a:xfrm>
+          <a:off x="0" y="0"/>
+          <a:ext cx="0" cy="0"/>
+          <a:chOff x="0" y="0"/>
+          <a:chExt cx="0" cy="0"/>
+        </a:xfrm>
+      </p:grpSpPr>
+      <p:sp>
+        <p:nvSpPr>
+          <p:cNvPr id="2" name="Title 1">
+            <a:extLst>
+              <a:ext uri="{FF2B5EF4-FFF2-40B4-BE49-F238E27FC236}">
+                <a16:creationId xmlns:a16="http://schemas.microsoft.com/office/drawing/2014/main" id="{F88ED850-934C-D220-CFB1-ABB886BAFE3D}"/>
+              </a:ext>
+            </a:extLst>
+          </p:cNvPr>
+          <p:cNvSpPr>
+            <a:spLocks noGrp="1"/>
+          </p:cNvSpPr>
+          <p:nvPr>
+            <p:ph type="title"/>
+          </p:nvPr>
+        </p:nvSpPr>
+        <p:spPr/>
+        <p:txBody>
+          <a:bodyPr/>
+          <a:lstStyle/>
+          <a:p>
+            <a:r>
+              <a:rPr lang="en-US" dirty="0"/>
+              <a:t>Why is structured output important?</a:t>
+            </a:r>
+          </a:p>
+        </p:txBody>
+      </p:sp>
+      <p:sp>
+        <p:nvSpPr>
+          <p:cNvPr id="3" name="Content Placeholder 2">
+            <a:extLst>
+              <a:ext uri="{FF2B5EF4-FFF2-40B4-BE49-F238E27FC236}">
+                <a16:creationId xmlns:a16="http://schemas.microsoft.com/office/drawing/2014/main" id="{985FC3D6-0506-7108-8F6C-B7239574EE0E}"/>
+              </a:ext>
+            </a:extLst>
+          </p:cNvPr>
+          <p:cNvSpPr>
+            <a:spLocks noGrp="1"/>
+          </p:cNvSpPr>
+          <p:nvPr>
+            <p:ph idx="1"/>
+          </p:nvPr>
+        </p:nvSpPr>
+        <p:spPr/>
+        <p:txBody>
+          <a:bodyPr>
+            <a:normAutofit/>
+          </a:bodyPr>
+          <a:lstStyle/>
+          <a:p>
+            <a:r>
+              <a:rPr lang="en-US" dirty="0"/>
+              <a:t>We can design a set of microservices, exposing APIs that receive data and instructions, supported by classes that can interact with one another.</a:t>
+            </a:r>
+          </a:p>
+          <a:p>
+            <a:r>
+              <a:rPr lang="en-US" dirty="0"/>
+              <a:t>Each class encapsulates its own AI-driven business logic and is able to orchestrate with other components, producing high-quality and consistent results.</a:t>
+            </a:r>
+          </a:p>
+          <a:p>
+            <a:endParaRPr lang="en-US" dirty="0"/>
+          </a:p>
+          <a:p>
+            <a:endParaRPr lang="en-US" dirty="0"/>
+          </a:p>
+        </p:txBody>
+      </p:sp>
+    </p:spTree>
+    <p:extLst>
+      <p:ext uri="{BB962C8B-B14F-4D97-AF65-F5344CB8AC3E}">
+        <p14:creationId xmlns:p14="http://schemas.microsoft.com/office/powerpoint/2010/main" val="3535394958"/>
+      </p:ext>
+    </p:extLst>
+  </p:cSld>
+  <p:clrMapOvr>
+    <a:masterClrMapping/>
+  </p:clrMapOvr>
+</p:sld>
+</file>
+
+<file path=ppt/slides/slide14.xml><?xml version="1.0" encoding="utf-8"?>
+<p:sld xmlns:a="http://schemas.openxmlformats.org/drawingml/2006/main" xmlns:r="http://schemas.openxmlformats.org/officeDocument/2006/relationships" xmlns:p="http://schemas.openxmlformats.org/presentationml/2006/main" show="0">
+  <p:cSld>
+    <p:spTree>
+      <p:nvGrpSpPr>
+        <p:cNvPr id="1" name=""/>
+        <p:cNvGrpSpPr/>
+        <p:nvPr/>
+      </p:nvGrpSpPr>
+      <p:grpSpPr>
+        <a:xfrm>
+          <a:off x="0" y="0"/>
+          <a:ext cx="0" cy="0"/>
+          <a:chOff x="0" y="0"/>
+          <a:chExt cx="0" cy="0"/>
+        </a:xfrm>
+      </p:grpSpPr>
+      <p:sp>
+        <p:nvSpPr>
+          <p:cNvPr id="2" name="Title 1">
+            <a:extLst>
+              <a:ext uri="{FF2B5EF4-FFF2-40B4-BE49-F238E27FC236}">
+                <a16:creationId xmlns:a16="http://schemas.microsoft.com/office/drawing/2014/main" id="{EB166805-D4D2-EFDF-D088-406FD03F15AC}"/>
+              </a:ext>
+            </a:extLst>
+          </p:cNvPr>
+          <p:cNvSpPr>
+            <a:spLocks noGrp="1"/>
+          </p:cNvSpPr>
+          <p:nvPr>
+            <p:ph type="title"/>
+          </p:nvPr>
+        </p:nvSpPr>
+        <p:spPr/>
+        <p:txBody>
+          <a:bodyPr/>
+          <a:lstStyle/>
+          <a:p>
+            <a:r>
+              <a:rPr lang="en-US" dirty="0"/>
+              <a:t>Another Use Case</a:t>
+            </a:r>
+          </a:p>
+        </p:txBody>
+      </p:sp>
+      <p:sp>
+        <p:nvSpPr>
+          <p:cNvPr id="3" name="Content Placeholder 2">
+            <a:extLst>
+              <a:ext uri="{FF2B5EF4-FFF2-40B4-BE49-F238E27FC236}">
+                <a16:creationId xmlns:a16="http://schemas.microsoft.com/office/drawing/2014/main" id="{6D106D2B-6F02-B58B-D1DF-7820501721CF}"/>
+              </a:ext>
+            </a:extLst>
+          </p:cNvPr>
+          <p:cNvSpPr>
+            <a:spLocks noGrp="1"/>
+          </p:cNvSpPr>
+          <p:nvPr>
+            <p:ph idx="1"/>
+          </p:nvPr>
+        </p:nvSpPr>
+        <p:spPr/>
+        <p:txBody>
+          <a:bodyPr>
+            <a:normAutofit fontScale="85000" lnSpcReduction="10000"/>
+          </a:bodyPr>
+          <a:lstStyle/>
+          <a:p>
+            <a:r>
+              <a:rPr lang="en-US" dirty="0"/>
+              <a:t>Another use case is leveraging structured inputs, such as friendly, guided questions, and connecting the agent directly to database inputs.</a:t>
+            </a:r>
+          </a:p>
+          <a:p>
+            <a:r>
+              <a:rPr lang="en-US" dirty="0"/>
+              <a:t>Additionally, we can:</a:t>
+            </a:r>
+          </a:p>
+          <a:p>
+            <a:pPr lvl="1"/>
+            <a:r>
+              <a:rPr lang="en-US" dirty="0"/>
+              <a:t>define regex-based rules for data filtering</a:t>
+            </a:r>
+          </a:p>
+          <a:p>
+            <a:pPr lvl="1"/>
+            <a:r>
+              <a:rPr lang="en-US" dirty="0"/>
+              <a:t>orchestrate API workflows</a:t>
+            </a:r>
+          </a:p>
+          <a:p>
+            <a:pPr lvl="1"/>
+            <a:r>
+              <a:rPr lang="en-US" dirty="0"/>
+              <a:t>perform data transformation and enrichment</a:t>
+            </a:r>
+          </a:p>
+          <a:p>
+            <a:r>
+              <a:rPr lang="en-US" dirty="0"/>
+              <a:t>In this context, structured output allows us to make our APIs significantly more dynamic, enabling them to produce precise, actionable, and business-oriented information.</a:t>
+            </a:r>
+          </a:p>
+          <a:p>
+            <a:r>
+              <a:rPr lang="en-US" dirty="0"/>
+              <a:t>What would traditionally require two development sprints to implement a complex architecture can be delivered in significantly less time using structured output, with greater predictability, lower complexity, and faster time to value.</a:t>
+            </a:r>
+          </a:p>
+          <a:p>
+            <a:endParaRPr lang="en-US" dirty="0"/>
+          </a:p>
+          <a:p>
+            <a:endParaRPr lang="en-US" dirty="0"/>
+          </a:p>
+        </p:txBody>
+      </p:sp>
+    </p:spTree>
+    <p:extLst>
+      <p:ext uri="{BB962C8B-B14F-4D97-AF65-F5344CB8AC3E}">
+        <p14:creationId xmlns:p14="http://schemas.microsoft.com/office/powerpoint/2010/main" val="1242638240"/>
+      </p:ext>
+    </p:extLst>
+  </p:cSld>
+  <p:clrMapOvr>
+    <a:masterClrMapping/>
+  </p:clrMapOvr>
+</p:sld>
+</file>
+
+<file path=ppt/slides/slide15.xml><?xml version="1.0" encoding="utf-8"?>
 <p:sld xmlns:a="http://schemas.openxmlformats.org/drawingml/2006/main" xmlns:r="http://schemas.openxmlformats.org/officeDocument/2006/relationships" xmlns:p="http://schemas.openxmlformats.org/presentationml/2006/main">
   <p:cSld>
     <p:spTree>
@@ -9281,10 +9514,10 @@
       </p:grpSpPr>
       <p:sp>
         <p:nvSpPr>
-          <p:cNvPr id="2" name="Title 1">
-            <a:extLst>
-              <a:ext uri="{FF2B5EF4-FFF2-40B4-BE49-F238E27FC236}">
-                <a16:creationId xmlns:a16="http://schemas.microsoft.com/office/drawing/2014/main" id="{F88ED850-934C-D220-CFB1-ABB886BAFE3D}"/>
+          <p:cNvPr id="4" name="Title 3">
+            <a:extLst>
+              <a:ext uri="{FF2B5EF4-FFF2-40B4-BE49-F238E27FC236}">
+                <a16:creationId xmlns:a16="http://schemas.microsoft.com/office/drawing/2014/main" id="{CFBAC40C-AD99-ED98-D324-94A9D485BC1D}"/>
               </a:ext>
             </a:extLst>
           </p:cNvPr>
@@ -9302,17 +9535,17 @@
           <a:p>
             <a:r>
               <a:rPr lang="en-US" dirty="0"/>
-              <a:t>Why is structured output important?</a:t>
-            </a:r>
-          </a:p>
-        </p:txBody>
-      </p:sp>
-      <p:sp>
-        <p:nvSpPr>
-          <p:cNvPr id="3" name="Content Placeholder 2">
-            <a:extLst>
-              <a:ext uri="{FF2B5EF4-FFF2-40B4-BE49-F238E27FC236}">
-                <a16:creationId xmlns:a16="http://schemas.microsoft.com/office/drawing/2014/main" id="{985FC3D6-0506-7108-8F6C-B7239574EE0E}"/>
+              <a:t>Demonstration</a:t>
+            </a:r>
+          </a:p>
+        </p:txBody>
+      </p:sp>
+      <p:sp>
+        <p:nvSpPr>
+          <p:cNvPr id="5" name="Content Placeholder 4">
+            <a:extLst>
+              <a:ext uri="{FF2B5EF4-FFF2-40B4-BE49-F238E27FC236}">
+                <a16:creationId xmlns:a16="http://schemas.microsoft.com/office/drawing/2014/main" id="{A7086445-8FE7-D98F-DD98-DFE92F4F9F75}"/>
               </a:ext>
             </a:extLst>
           </p:cNvPr>
@@ -9332,13 +9565,62 @@
           <a:p>
             <a:r>
               <a:rPr lang="en-US" dirty="0"/>
-              <a:t>We can design a set of microservices, exposing APIs that receive data and instructions, supported by classes that can interact with one another.</a:t>
-            </a:r>
-          </a:p>
-          <a:p>
-            <a:r>
+              <a:t>PATCH /employees:</a:t>
+            </a:r>
+            <a:br>
               <a:rPr lang="en-US" dirty="0"/>
-              <a:t>Each class encapsulates its own AI-driven business logic and is able to orchestrate with other components, producing high-quality and consistent results.</a:t>
+            </a:br>
+            <a:r>
+              <a:rPr lang="en-US" dirty="0"/>
+              <a:t>Reads Chat Config, executes an Azure OpenAI agent that generates an </a:t>
+            </a:r>
+            <a:r>
+              <a:rPr lang="en-US" dirty="0" err="1"/>
+              <a:t>AIResponse</a:t>
+            </a:r>
+            <a:r>
+              <a:rPr lang="en-US" dirty="0"/>
+              <a:t>, which is used as a filter (</a:t>
+            </a:r>
+            <a:r>
+              <a:rPr lang="en-US" dirty="0" err="1"/>
+              <a:t>filter.AIAnswer</a:t>
+            </a:r>
+            <a:r>
+              <a:rPr lang="en-US" dirty="0"/>
+              <a:t>) to query the Employee Repository, and return the list of employees.</a:t>
+            </a:r>
+          </a:p>
+          <a:p>
+            <a:endParaRPr lang="en-US" dirty="0"/>
+          </a:p>
+          <a:p>
+            <a:r>
+              <a:rPr lang="en-US" dirty="0"/>
+              <a:t>POST /agent-run:</a:t>
+            </a:r>
+            <a:br>
+              <a:rPr lang="en-US" dirty="0"/>
+            </a:br>
+            <a:r>
+              <a:rPr lang="en-US" dirty="0"/>
+              <a:t>Reads Chat Config, executes an Azure OpenAI agent that produces a </a:t>
+            </a:r>
+            <a:r>
+              <a:rPr lang="en-US" dirty="0" err="1"/>
+              <a:t>PersonInfo</a:t>
+            </a:r>
+            <a:r>
+              <a:rPr lang="en-US" dirty="0"/>
+              <a:t> JSON, deserializes it, and returns the </a:t>
+            </a:r>
+            <a:r>
+              <a:rPr lang="en-US" dirty="0" err="1"/>
+              <a:t>PersonInfo</a:t>
+            </a:r>
+            <a:r>
+              <a:rPr lang="en-US" dirty="0"/>
+              <a:t> object</a:t>
             </a:r>
           </a:p>
           <a:p>
@@ -9352,7 +9634,7 @@
     </p:spTree>
     <p:extLst>
       <p:ext uri="{BB962C8B-B14F-4D97-AF65-F5344CB8AC3E}">
-        <p14:creationId xmlns:p14="http://schemas.microsoft.com/office/powerpoint/2010/main" val="3535394958"/>
+        <p14:creationId xmlns:p14="http://schemas.microsoft.com/office/powerpoint/2010/main" val="1807691148"/>
       </p:ext>
     </p:extLst>
   </p:cSld>
@@ -9362,140 +9644,7 @@
 </p:sld>
 </file>
 
-<file path=ppt/slides/slide14.xml><?xml version="1.0" encoding="utf-8"?>
-<p:sld xmlns:a="http://schemas.openxmlformats.org/drawingml/2006/main" xmlns:r="http://schemas.openxmlformats.org/officeDocument/2006/relationships" xmlns:p="http://schemas.openxmlformats.org/presentationml/2006/main">
-  <p:cSld>
-    <p:spTree>
-      <p:nvGrpSpPr>
-        <p:cNvPr id="1" name=""/>
-        <p:cNvGrpSpPr/>
-        <p:nvPr/>
-      </p:nvGrpSpPr>
-      <p:grpSpPr>
-        <a:xfrm>
-          <a:off x="0" y="0"/>
-          <a:ext cx="0" cy="0"/>
-          <a:chOff x="0" y="0"/>
-          <a:chExt cx="0" cy="0"/>
-        </a:xfrm>
-      </p:grpSpPr>
-      <p:sp>
-        <p:nvSpPr>
-          <p:cNvPr id="2" name="Title 1">
-            <a:extLst>
-              <a:ext uri="{FF2B5EF4-FFF2-40B4-BE49-F238E27FC236}">
-                <a16:creationId xmlns:a16="http://schemas.microsoft.com/office/drawing/2014/main" id="{EB166805-D4D2-EFDF-D088-406FD03F15AC}"/>
-              </a:ext>
-            </a:extLst>
-          </p:cNvPr>
-          <p:cNvSpPr>
-            <a:spLocks noGrp="1"/>
-          </p:cNvSpPr>
-          <p:nvPr>
-            <p:ph type="title"/>
-          </p:nvPr>
-        </p:nvSpPr>
-        <p:spPr/>
-        <p:txBody>
-          <a:bodyPr/>
-          <a:lstStyle/>
-          <a:p>
-            <a:r>
-              <a:rPr lang="en-US" dirty="0"/>
-              <a:t>Another Use Case</a:t>
-            </a:r>
-          </a:p>
-        </p:txBody>
-      </p:sp>
-      <p:sp>
-        <p:nvSpPr>
-          <p:cNvPr id="3" name="Content Placeholder 2">
-            <a:extLst>
-              <a:ext uri="{FF2B5EF4-FFF2-40B4-BE49-F238E27FC236}">
-                <a16:creationId xmlns:a16="http://schemas.microsoft.com/office/drawing/2014/main" id="{6D106D2B-6F02-B58B-D1DF-7820501721CF}"/>
-              </a:ext>
-            </a:extLst>
-          </p:cNvPr>
-          <p:cNvSpPr>
-            <a:spLocks noGrp="1"/>
-          </p:cNvSpPr>
-          <p:nvPr>
-            <p:ph idx="1"/>
-          </p:nvPr>
-        </p:nvSpPr>
-        <p:spPr/>
-        <p:txBody>
-          <a:bodyPr>
-            <a:normAutofit fontScale="85000" lnSpcReduction="10000"/>
-          </a:bodyPr>
-          <a:lstStyle/>
-          <a:p>
-            <a:r>
-              <a:rPr lang="en-US" dirty="0"/>
-              <a:t>Another use case is leveraging structured inputs, such as friendly, guided questions, and connecting the agent directly to database inputs.</a:t>
-            </a:r>
-          </a:p>
-          <a:p>
-            <a:r>
-              <a:rPr lang="en-US" dirty="0"/>
-              <a:t>Additionally, we can:</a:t>
-            </a:r>
-          </a:p>
-          <a:p>
-            <a:pPr lvl="1"/>
-            <a:r>
-              <a:rPr lang="en-US" dirty="0"/>
-              <a:t>define regex-based rules for data filtering</a:t>
-            </a:r>
-          </a:p>
-          <a:p>
-            <a:pPr lvl="1"/>
-            <a:r>
-              <a:rPr lang="en-US" dirty="0"/>
-              <a:t>orchestrate API workflows</a:t>
-            </a:r>
-          </a:p>
-          <a:p>
-            <a:pPr lvl="1"/>
-            <a:r>
-              <a:rPr lang="en-US" dirty="0"/>
-              <a:t>perform data transformation and enrichment</a:t>
-            </a:r>
-          </a:p>
-          <a:p>
-            <a:r>
-              <a:rPr lang="en-US" dirty="0"/>
-              <a:t>In this context, structured output allows us to make our APIs significantly more dynamic, enabling them to produce precise, actionable, and business-oriented information.</a:t>
-            </a:r>
-          </a:p>
-          <a:p>
-            <a:r>
-              <a:rPr lang="en-US" dirty="0"/>
-              <a:t>What would traditionally require two development sprints to implement a complex architecture can be delivered in significantly less time using structured output, with greater predictability, lower complexity, and faster time to value.</a:t>
-            </a:r>
-          </a:p>
-          <a:p>
-            <a:endParaRPr lang="en-US" dirty="0"/>
-          </a:p>
-          <a:p>
-            <a:endParaRPr lang="en-US" dirty="0"/>
-          </a:p>
-        </p:txBody>
-      </p:sp>
-    </p:spTree>
-    <p:extLst>
-      <p:ext uri="{BB962C8B-B14F-4D97-AF65-F5344CB8AC3E}">
-        <p14:creationId xmlns:p14="http://schemas.microsoft.com/office/powerpoint/2010/main" val="1242638240"/>
-      </p:ext>
-    </p:extLst>
-  </p:cSld>
-  <p:clrMapOvr>
-    <a:masterClrMapping/>
-  </p:clrMapOvr>
-</p:sld>
-</file>
-
-<file path=ppt/slides/slide15.xml><?xml version="1.0" encoding="utf-8"?>
+<file path=ppt/slides/slide16.xml><?xml version="1.0" encoding="utf-8"?>
 <p:sld xmlns:a="http://schemas.openxmlformats.org/drawingml/2006/main" xmlns:r="http://schemas.openxmlformats.org/officeDocument/2006/relationships" xmlns:p="http://schemas.openxmlformats.org/presentationml/2006/main">
   <p:cSld>
     <p:spTree>
@@ -9578,155 +9727,6 @@
     <p:extLst>
       <p:ext uri="{BB962C8B-B14F-4D97-AF65-F5344CB8AC3E}">
         <p14:creationId xmlns:p14="http://schemas.microsoft.com/office/powerpoint/2010/main" val="1227525199"/>
-      </p:ext>
-    </p:extLst>
-  </p:cSld>
-  <p:clrMapOvr>
-    <a:masterClrMapping/>
-  </p:clrMapOvr>
-</p:sld>
-</file>
-
-<file path=ppt/slides/slide16.xml><?xml version="1.0" encoding="utf-8"?>
-<p:sld xmlns:a="http://schemas.openxmlformats.org/drawingml/2006/main" xmlns:r="http://schemas.openxmlformats.org/officeDocument/2006/relationships" xmlns:p="http://schemas.openxmlformats.org/presentationml/2006/main">
-  <p:cSld>
-    <p:spTree>
-      <p:nvGrpSpPr>
-        <p:cNvPr id="1" name=""/>
-        <p:cNvGrpSpPr/>
-        <p:nvPr/>
-      </p:nvGrpSpPr>
-      <p:grpSpPr>
-        <a:xfrm>
-          <a:off x="0" y="0"/>
-          <a:ext cx="0" cy="0"/>
-          <a:chOff x="0" y="0"/>
-          <a:chExt cx="0" cy="0"/>
-        </a:xfrm>
-      </p:grpSpPr>
-      <p:sp>
-        <p:nvSpPr>
-          <p:cNvPr id="4" name="Title 3">
-            <a:extLst>
-              <a:ext uri="{FF2B5EF4-FFF2-40B4-BE49-F238E27FC236}">
-                <a16:creationId xmlns:a16="http://schemas.microsoft.com/office/drawing/2014/main" id="{CFBAC40C-AD99-ED98-D324-94A9D485BC1D}"/>
-              </a:ext>
-            </a:extLst>
-          </p:cNvPr>
-          <p:cNvSpPr>
-            <a:spLocks noGrp="1"/>
-          </p:cNvSpPr>
-          <p:nvPr>
-            <p:ph type="title"/>
-          </p:nvPr>
-        </p:nvSpPr>
-        <p:spPr/>
-        <p:txBody>
-          <a:bodyPr/>
-          <a:lstStyle/>
-          <a:p>
-            <a:r>
-              <a:rPr lang="en-US" dirty="0"/>
-              <a:t>Demonstration</a:t>
-            </a:r>
-          </a:p>
-        </p:txBody>
-      </p:sp>
-      <p:sp>
-        <p:nvSpPr>
-          <p:cNvPr id="5" name="Content Placeholder 4">
-            <a:extLst>
-              <a:ext uri="{FF2B5EF4-FFF2-40B4-BE49-F238E27FC236}">
-                <a16:creationId xmlns:a16="http://schemas.microsoft.com/office/drawing/2014/main" id="{A7086445-8FE7-D98F-DD98-DFE92F4F9F75}"/>
-              </a:ext>
-            </a:extLst>
-          </p:cNvPr>
-          <p:cNvSpPr>
-            <a:spLocks noGrp="1"/>
-          </p:cNvSpPr>
-          <p:nvPr>
-            <p:ph idx="1"/>
-          </p:nvPr>
-        </p:nvSpPr>
-        <p:spPr/>
-        <p:txBody>
-          <a:bodyPr>
-            <a:normAutofit/>
-          </a:bodyPr>
-          <a:lstStyle/>
-          <a:p>
-            <a:r>
-              <a:rPr lang="en-US" dirty="0"/>
-              <a:t>PATCH /employees:</a:t>
-            </a:r>
-            <a:br>
-              <a:rPr lang="en-US" dirty="0"/>
-            </a:br>
-            <a:r>
-              <a:rPr lang="en-US" dirty="0"/>
-              <a:t>Reads Chat Config, executes an Azure OpenAI agent that generates an </a:t>
-            </a:r>
-            <a:r>
-              <a:rPr lang="en-US" dirty="0" err="1"/>
-              <a:t>AIResponse</a:t>
-            </a:r>
-            <a:r>
-              <a:rPr lang="en-US" dirty="0"/>
-              <a:t>, which is used as a filter (</a:t>
-            </a:r>
-            <a:r>
-              <a:rPr lang="en-US" dirty="0" err="1"/>
-              <a:t>filter.AIAnswer</a:t>
-            </a:r>
-            <a:r>
-              <a:rPr lang="en-US" dirty="0"/>
-              <a:t>) to query the Employee Repository, and return the list of employees.</a:t>
-            </a:r>
-          </a:p>
-          <a:p>
-            <a:endParaRPr lang="en-US" dirty="0"/>
-          </a:p>
-          <a:p>
-            <a:r>
-              <a:rPr lang="en-US" dirty="0"/>
-              <a:t>POST /agent-run:</a:t>
-            </a:r>
-            <a:br>
-              <a:rPr lang="en-US" dirty="0"/>
-            </a:br>
-            <a:r>
-              <a:rPr lang="en-US" dirty="0"/>
-              <a:t>Reads Chat Config, executes an Azure OpenAI agent that produces a </a:t>
-            </a:r>
-            <a:r>
-              <a:rPr lang="en-US" dirty="0" err="1"/>
-              <a:t>PersonInfo</a:t>
-            </a:r>
-            <a:r>
-              <a:rPr lang="en-US" dirty="0"/>
-              <a:t> JSON, deserializes it, and returns the </a:t>
-            </a:r>
-            <a:r>
-              <a:rPr lang="en-US" dirty="0" err="1"/>
-              <a:t>PersonInfo</a:t>
-            </a:r>
-            <a:r>
-              <a:rPr lang="en-US" dirty="0"/>
-              <a:t> object</a:t>
-            </a:r>
-          </a:p>
-          <a:p>
-            <a:endParaRPr lang="en-US" dirty="0"/>
-          </a:p>
-          <a:p>
-            <a:endParaRPr lang="en-US" dirty="0"/>
-          </a:p>
-        </p:txBody>
-      </p:sp>
-    </p:spTree>
-    <p:extLst>
-      <p:ext uri="{BB962C8B-B14F-4D97-AF65-F5344CB8AC3E}">
-        <p14:creationId xmlns:p14="http://schemas.microsoft.com/office/powerpoint/2010/main" val="1807691148"/>
       </p:ext>
     </p:extLst>
   </p:cSld>

</xml_diff>